<commit_message>
Created Title on Poster
</commit_message>
<xml_diff>
--- a/Poster templates_horizontal.pptx
+++ b/Poster templates_horizontal.pptx
@@ -222,7 +222,7 @@
           <a:p>
             <a:fld id="{C8685A03-C055-4A50-BB75-8419692FA181}" type="datetimeFigureOut">
               <a:rPr lang="en-US" smtClean="0"/>
-              <a:t>4/14/2023</a:t>
+              <a:t>4/21/23</a:t>
             </a:fld>
             <a:endParaRPr lang="en-US"/>
           </a:p>
@@ -620,7 +620,7 @@
           <a:p>
             <a:fld id="{17E1FF6A-9A55-7A49-AA3D-2E4EBBB4B541}" type="datetimeFigureOut">
               <a:rPr lang="en-US" smtClean="0"/>
-              <a:t>4/14/2023</a:t>
+              <a:t>4/21/23</a:t>
             </a:fld>
             <a:endParaRPr lang="en-US"/>
           </a:p>
@@ -790,7 +790,7 @@
           <a:p>
             <a:fld id="{17E1FF6A-9A55-7A49-AA3D-2E4EBBB4B541}" type="datetimeFigureOut">
               <a:rPr lang="en-US" smtClean="0"/>
-              <a:t>4/14/2023</a:t>
+              <a:t>4/21/23</a:t>
             </a:fld>
             <a:endParaRPr lang="en-US"/>
           </a:p>
@@ -970,7 +970,7 @@
           <a:p>
             <a:fld id="{17E1FF6A-9A55-7A49-AA3D-2E4EBBB4B541}" type="datetimeFigureOut">
               <a:rPr lang="en-US" smtClean="0"/>
-              <a:t>4/14/2023</a:t>
+              <a:t>4/21/23</a:t>
             </a:fld>
             <a:endParaRPr lang="en-US"/>
           </a:p>
@@ -1140,7 +1140,7 @@
           <a:p>
             <a:fld id="{17E1FF6A-9A55-7A49-AA3D-2E4EBBB4B541}" type="datetimeFigureOut">
               <a:rPr lang="en-US" smtClean="0"/>
-              <a:t>4/14/2023</a:t>
+              <a:t>4/21/23</a:t>
             </a:fld>
             <a:endParaRPr lang="en-US"/>
           </a:p>
@@ -1384,7 +1384,7 @@
           <a:p>
             <a:fld id="{17E1FF6A-9A55-7A49-AA3D-2E4EBBB4B541}" type="datetimeFigureOut">
               <a:rPr lang="en-US" smtClean="0"/>
-              <a:t>4/14/2023</a:t>
+              <a:t>4/21/23</a:t>
             </a:fld>
             <a:endParaRPr lang="en-US"/>
           </a:p>
@@ -1616,7 +1616,7 @@
           <a:p>
             <a:fld id="{17E1FF6A-9A55-7A49-AA3D-2E4EBBB4B541}" type="datetimeFigureOut">
               <a:rPr lang="en-US" smtClean="0"/>
-              <a:t>4/14/2023</a:t>
+              <a:t>4/21/23</a:t>
             </a:fld>
             <a:endParaRPr lang="en-US"/>
           </a:p>
@@ -1983,7 +1983,7 @@
           <a:p>
             <a:fld id="{17E1FF6A-9A55-7A49-AA3D-2E4EBBB4B541}" type="datetimeFigureOut">
               <a:rPr lang="en-US" smtClean="0"/>
-              <a:t>4/14/2023</a:t>
+              <a:t>4/21/23</a:t>
             </a:fld>
             <a:endParaRPr lang="en-US"/>
           </a:p>
@@ -2101,7 +2101,7 @@
           <a:p>
             <a:fld id="{17E1FF6A-9A55-7A49-AA3D-2E4EBBB4B541}" type="datetimeFigureOut">
               <a:rPr lang="en-US" smtClean="0"/>
-              <a:t>4/14/2023</a:t>
+              <a:t>4/21/23</a:t>
             </a:fld>
             <a:endParaRPr lang="en-US"/>
           </a:p>
@@ -2196,7 +2196,7 @@
           <a:p>
             <a:fld id="{17E1FF6A-9A55-7A49-AA3D-2E4EBBB4B541}" type="datetimeFigureOut">
               <a:rPr lang="en-US" smtClean="0"/>
-              <a:t>4/14/2023</a:t>
+              <a:t>4/21/23</a:t>
             </a:fld>
             <a:endParaRPr lang="en-US"/>
           </a:p>
@@ -2473,7 +2473,7 @@
           <a:p>
             <a:fld id="{17E1FF6A-9A55-7A49-AA3D-2E4EBBB4B541}" type="datetimeFigureOut">
               <a:rPr lang="en-US" smtClean="0"/>
-              <a:t>4/14/2023</a:t>
+              <a:t>4/21/23</a:t>
             </a:fld>
             <a:endParaRPr lang="en-US"/>
           </a:p>
@@ -2730,7 +2730,7 @@
           <a:p>
             <a:fld id="{17E1FF6A-9A55-7A49-AA3D-2E4EBBB4B541}" type="datetimeFigureOut">
               <a:rPr lang="en-US" smtClean="0"/>
-              <a:t>4/14/2023</a:t>
+              <a:t>4/21/23</a:t>
             </a:fld>
             <a:endParaRPr lang="en-US"/>
           </a:p>
@@ -2943,7 +2943,7 @@
           <a:p>
             <a:fld id="{81B1FA28-4A1F-40C5-8B9A-7CF7657742B4}" type="datetimeFigureOut">
               <a:rPr lang="en-US" smtClean="0"/>
-              <a:t>4/14/2023</a:t>
+              <a:t>4/21/23</a:t>
             </a:fld>
             <a:endParaRPr lang="en-US" dirty="0"/>
           </a:p>
@@ -3391,7 +3391,7 @@
         <p:spPr>
           <a:xfrm>
             <a:off x="6622473" y="676697"/>
-            <a:ext cx="25492364" cy="2308324"/>
+            <a:ext cx="25492364" cy="3416320"/>
           </a:xfrm>
           <a:prstGeom prst="rect">
             <a:avLst/>
@@ -3416,7 +3416,7 @@
                 <a:ea typeface="Avenir Book" charset="0"/>
                 <a:cs typeface="Avenir Book" charset="0"/>
               </a:rPr>
-              <a:t>Poster Title</a:t>
+              <a:t>Riparian Buffer Percent Coverage  Effect On Aquatic Macroinvertebrates Richness</a:t>
             </a:r>
           </a:p>
           <a:p>
@@ -3466,7 +3466,7 @@
                 <a:ea typeface="Avenir Book" charset="0"/>
                 <a:cs typeface="Avenir Book" charset="0"/>
               </a:rPr>
-              <a:t>Authors</a:t>
+              <a:t>Chelsey Burks, Jonathan Ray, Callie Wallace </a:t>
             </a:r>
           </a:p>
         </p:txBody>
@@ -3524,8 +3524,30 @@
                 <a:ea typeface="Avenir Book" charset="0"/>
                 <a:cs typeface="Avenir Book" charset="0"/>
               </a:rPr>
-              <a:t>Introduction/Background</a:t>
-            </a:r>
+              <a:t>Introduction</a:t>
+            </a:r>
+            <a:r>
+              <a:rPr lang="en-US" sz="4400" b="1">
+                <a:solidFill>
+                  <a:prstClr val="black"/>
+                </a:solidFill>
+                <a:latin typeface="Avenir Book" charset="0"/>
+                <a:ea typeface="Avenir Book" charset="0"/>
+                <a:cs typeface="Avenir Book" charset="0"/>
+              </a:rPr>
+              <a:t>/Background</a:t>
+            </a:r>
+          </a:p>
+          <a:p>
+            <a:pPr defTabSz="3511068"/>
+            <a:endParaRPr lang="en-US" sz="4400" b="1" dirty="0">
+              <a:solidFill>
+                <a:prstClr val="black"/>
+              </a:solidFill>
+              <a:latin typeface="Avenir Book" charset="0"/>
+              <a:ea typeface="Avenir Book" charset="0"/>
+              <a:cs typeface="Avenir Book" charset="0"/>
+            </a:endParaRPr>
           </a:p>
         </p:txBody>
       </p:sp>
@@ -4646,68 +4668,6 @@
 </file>
 
 <file path=customXml/item1.xml><?xml version="1.0" encoding="utf-8"?>
-<?mso-contentType ?>
-<FormTemplates xmlns="http://schemas.microsoft.com/sharepoint/v3/contenttype/forms">
-  <Display>DocumentLibraryForm</Display>
-  <Edit>DocumentLibraryForm</Edit>
-  <New>DocumentLibraryForm</New>
-</FormTemplates>
-</file>
-
-<file path=customXml/item2.xml><?xml version="1.0" encoding="utf-8"?>
-<p:properties xmlns:p="http://schemas.microsoft.com/office/2006/metadata/properties" xmlns:xsi="http://www.w3.org/2001/XMLSchema-instance" xmlns:pc="http://schemas.microsoft.com/office/infopath/2007/PartnerControls">
-  <documentManagement>
-    <LMS_Mappings xmlns="6b544d46-9b2a-4003-bc91-8ec45b0e4a0d" xsi:nil="true"/>
-    <_ip_UnifiedCompliancePolicyUIAction xmlns="http://schemas.microsoft.com/sharepoint/v3" xsi:nil="true"/>
-    <Is_Collaboration_Space_Locked xmlns="6b544d46-9b2a-4003-bc91-8ec45b0e4a0d" xsi:nil="true"/>
-    <Math_Settings xmlns="6b544d46-9b2a-4003-bc91-8ec45b0e4a0d" xsi:nil="true"/>
-    <Members xmlns="6b544d46-9b2a-4003-bc91-8ec45b0e4a0d">
-      <UserInfo>
-        <DisplayName/>
-        <AccountId xsi:nil="true"/>
-        <AccountType/>
-      </UserInfo>
-    </Members>
-    <Has_Leaders_Only_SectionGroup xmlns="6b544d46-9b2a-4003-bc91-8ec45b0e4a0d" xsi:nil="true"/>
-    <Owner xmlns="6b544d46-9b2a-4003-bc91-8ec45b0e4a0d">
-      <UserInfo>
-        <DisplayName/>
-        <AccountId xsi:nil="true"/>
-        <AccountType/>
-      </UserInfo>
-    </Owner>
-    <Distribution_Groups xmlns="6b544d46-9b2a-4003-bc91-8ec45b0e4a0d" xsi:nil="true"/>
-    <Invited_Members xmlns="6b544d46-9b2a-4003-bc91-8ec45b0e4a0d" xsi:nil="true"/>
-    <Leaders xmlns="6b544d46-9b2a-4003-bc91-8ec45b0e4a0d">
-      <UserInfo>
-        <DisplayName/>
-        <AccountId xsi:nil="true"/>
-        <AccountType/>
-      </UserInfo>
-    </Leaders>
-    <_ip_UnifiedCompliancePolicyProperties xmlns="http://schemas.microsoft.com/sharepoint/v3" xsi:nil="true"/>
-    <Templates xmlns="6b544d46-9b2a-4003-bc91-8ec45b0e4a0d" xsi:nil="true"/>
-    <Self_Registration_Enabled xmlns="6b544d46-9b2a-4003-bc91-8ec45b0e4a0d" xsi:nil="true"/>
-    <AppVersion xmlns="6b544d46-9b2a-4003-bc91-8ec45b0e4a0d" xsi:nil="true"/>
-    <DefaultSectionNames xmlns="6b544d46-9b2a-4003-bc91-8ec45b0e4a0d" xsi:nil="true"/>
-    <CultureName xmlns="6b544d46-9b2a-4003-bc91-8ec45b0e4a0d" xsi:nil="true"/>
-    <TeamsChannelId xmlns="6b544d46-9b2a-4003-bc91-8ec45b0e4a0d" xsi:nil="true"/>
-    <Invited_Leaders xmlns="6b544d46-9b2a-4003-bc91-8ec45b0e4a0d" xsi:nil="true"/>
-    <IsNotebookLocked xmlns="6b544d46-9b2a-4003-bc91-8ec45b0e4a0d" xsi:nil="true"/>
-    <Member_Groups xmlns="6b544d46-9b2a-4003-bc91-8ec45b0e4a0d">
-      <UserInfo>
-        <DisplayName/>
-        <AccountId xsi:nil="true"/>
-        <AccountType/>
-      </UserInfo>
-    </Member_Groups>
-    <NotebookType xmlns="6b544d46-9b2a-4003-bc91-8ec45b0e4a0d" xsi:nil="true"/>
-    <FolderType xmlns="6b544d46-9b2a-4003-bc91-8ec45b0e4a0d" xsi:nil="true"/>
-  </documentManagement>
-</p:properties>
-</file>
-
-<file path=customXml/item3.xml><?xml version="1.0" encoding="utf-8"?>
 <ct:contentTypeSchema xmlns:ct="http://schemas.microsoft.com/office/2006/metadata/contentType" xmlns:ma="http://schemas.microsoft.com/office/2006/metadata/properties/metaAttributes" ct:_="" ma:_="" ma:contentTypeName="Document" ma:contentTypeID="0x010100654CAF8486C9E84495C47CB17428612F" ma:contentTypeVersion="36" ma:contentTypeDescription="Create a new document." ma:contentTypeScope="" ma:versionID="d218fca90878da09470f9d9c6913f761">
   <xsd:schema xmlns:xsd="http://www.w3.org/2001/XMLSchema" xmlns:xs="http://www.w3.org/2001/XMLSchema" xmlns:p="http://schemas.microsoft.com/office/2006/metadata/properties" xmlns:ns1="http://schemas.microsoft.com/sharepoint/v3" xmlns:ns3="24a4780b-b9b8-490f-9267-7801a440b1c2" xmlns:ns4="6b544d46-9b2a-4003-bc91-8ec45b0e4a0d" targetNamespace="http://schemas.microsoft.com/office/2006/metadata/properties" ma:root="true" ma:fieldsID="62b2a6bbd8efe47c1646205a6fed2971" ns1:_="" ns3:_="" ns4:_="">
     <xsd:import namespace="http://schemas.microsoft.com/sharepoint/v3"/>
@@ -5141,10 +5101,84 @@
 </ct:contentTypeSchema>
 </file>
 
+<file path=customXml/item2.xml><?xml version="1.0" encoding="utf-8"?>
+<p:properties xmlns:p="http://schemas.microsoft.com/office/2006/metadata/properties" xmlns:xsi="http://www.w3.org/2001/XMLSchema-instance" xmlns:pc="http://schemas.microsoft.com/office/infopath/2007/PartnerControls">
+  <documentManagement>
+    <LMS_Mappings xmlns="6b544d46-9b2a-4003-bc91-8ec45b0e4a0d" xsi:nil="true"/>
+    <_ip_UnifiedCompliancePolicyUIAction xmlns="http://schemas.microsoft.com/sharepoint/v3" xsi:nil="true"/>
+    <Is_Collaboration_Space_Locked xmlns="6b544d46-9b2a-4003-bc91-8ec45b0e4a0d" xsi:nil="true"/>
+    <Math_Settings xmlns="6b544d46-9b2a-4003-bc91-8ec45b0e4a0d" xsi:nil="true"/>
+    <Members xmlns="6b544d46-9b2a-4003-bc91-8ec45b0e4a0d">
+      <UserInfo>
+        <DisplayName/>
+        <AccountId xsi:nil="true"/>
+        <AccountType/>
+      </UserInfo>
+    </Members>
+    <Has_Leaders_Only_SectionGroup xmlns="6b544d46-9b2a-4003-bc91-8ec45b0e4a0d" xsi:nil="true"/>
+    <Owner xmlns="6b544d46-9b2a-4003-bc91-8ec45b0e4a0d">
+      <UserInfo>
+        <DisplayName/>
+        <AccountId xsi:nil="true"/>
+        <AccountType/>
+      </UserInfo>
+    </Owner>
+    <Distribution_Groups xmlns="6b544d46-9b2a-4003-bc91-8ec45b0e4a0d" xsi:nil="true"/>
+    <Invited_Members xmlns="6b544d46-9b2a-4003-bc91-8ec45b0e4a0d" xsi:nil="true"/>
+    <Leaders xmlns="6b544d46-9b2a-4003-bc91-8ec45b0e4a0d">
+      <UserInfo>
+        <DisplayName/>
+        <AccountId xsi:nil="true"/>
+        <AccountType/>
+      </UserInfo>
+    </Leaders>
+    <_ip_UnifiedCompliancePolicyProperties xmlns="http://schemas.microsoft.com/sharepoint/v3" xsi:nil="true"/>
+    <Templates xmlns="6b544d46-9b2a-4003-bc91-8ec45b0e4a0d" xsi:nil="true"/>
+    <Self_Registration_Enabled xmlns="6b544d46-9b2a-4003-bc91-8ec45b0e4a0d" xsi:nil="true"/>
+    <AppVersion xmlns="6b544d46-9b2a-4003-bc91-8ec45b0e4a0d" xsi:nil="true"/>
+    <DefaultSectionNames xmlns="6b544d46-9b2a-4003-bc91-8ec45b0e4a0d" xsi:nil="true"/>
+    <CultureName xmlns="6b544d46-9b2a-4003-bc91-8ec45b0e4a0d" xsi:nil="true"/>
+    <TeamsChannelId xmlns="6b544d46-9b2a-4003-bc91-8ec45b0e4a0d" xsi:nil="true"/>
+    <Invited_Leaders xmlns="6b544d46-9b2a-4003-bc91-8ec45b0e4a0d" xsi:nil="true"/>
+    <IsNotebookLocked xmlns="6b544d46-9b2a-4003-bc91-8ec45b0e4a0d" xsi:nil="true"/>
+    <Member_Groups xmlns="6b544d46-9b2a-4003-bc91-8ec45b0e4a0d">
+      <UserInfo>
+        <DisplayName/>
+        <AccountId xsi:nil="true"/>
+        <AccountType/>
+      </UserInfo>
+    </Member_Groups>
+    <NotebookType xmlns="6b544d46-9b2a-4003-bc91-8ec45b0e4a0d" xsi:nil="true"/>
+    <FolderType xmlns="6b544d46-9b2a-4003-bc91-8ec45b0e4a0d" xsi:nil="true"/>
+  </documentManagement>
+</p:properties>
+</file>
+
+<file path=customXml/item3.xml><?xml version="1.0" encoding="utf-8"?>
+<?mso-contentType ?>
+<FormTemplates xmlns="http://schemas.microsoft.com/sharepoint/v3/contenttype/forms">
+  <Display>DocumentLibraryForm</Display>
+  <Edit>DocumentLibraryForm</Edit>
+  <New>DocumentLibraryForm</New>
+</FormTemplates>
+</file>
+
 <file path=customXml/itemProps1.xml><?xml version="1.0" encoding="utf-8"?>
-<ds:datastoreItem xmlns:ds="http://schemas.openxmlformats.org/officeDocument/2006/customXml" ds:itemID="{61FBE2F1-E3E5-4809-A97E-1E6B42890106}">
+<ds:datastoreItem xmlns:ds="http://schemas.openxmlformats.org/officeDocument/2006/customXml" ds:itemID="{80469171-EA2F-47E3-8AA4-D53375A810EB}">
   <ds:schemaRefs>
-    <ds:schemaRef ds:uri="http://schemas.microsoft.com/sharepoint/v3/contenttype/forms"/>
+    <ds:schemaRef ds:uri="http://schemas.microsoft.com/office/2006/metadata/contentType"/>
+    <ds:schemaRef ds:uri="http://schemas.microsoft.com/office/2006/metadata/properties/metaAttributes"/>
+    <ds:schemaRef ds:uri="http://www.w3.org/2001/XMLSchema"/>
+    <ds:schemaRef ds:uri="http://schemas.microsoft.com/office/2006/metadata/properties"/>
+    <ds:schemaRef ds:uri="http://schemas.microsoft.com/sharepoint/v3"/>
+    <ds:schemaRef ds:uri="24a4780b-b9b8-490f-9267-7801a440b1c2"/>
+    <ds:schemaRef ds:uri="6b544d46-9b2a-4003-bc91-8ec45b0e4a0d"/>
+    <ds:schemaRef ds:uri="http://schemas.microsoft.com/office/2006/documentManagement/types"/>
+    <ds:schemaRef ds:uri="http://schemas.microsoft.com/office/infopath/2007/PartnerControls"/>
+    <ds:schemaRef ds:uri="http://schemas.openxmlformats.org/package/2006/metadata/core-properties"/>
+    <ds:schemaRef ds:uri="http://purl.org/dc/elements/1.1/"/>
+    <ds:schemaRef ds:uri="http://purl.org/dc/terms/"/>
+    <ds:schemaRef ds:uri="http://schemas.microsoft.com/internal/obd"/>
   </ds:schemaRefs>
 </ds:datastoreItem>
 </file>
@@ -5168,21 +5202,9 @@
 </file>
 
 <file path=customXml/itemProps3.xml><?xml version="1.0" encoding="utf-8"?>
-<ds:datastoreItem xmlns:ds="http://schemas.openxmlformats.org/officeDocument/2006/customXml" ds:itemID="{80469171-EA2F-47E3-8AA4-D53375A810EB}">
+<ds:datastoreItem xmlns:ds="http://schemas.openxmlformats.org/officeDocument/2006/customXml" ds:itemID="{61FBE2F1-E3E5-4809-A97E-1E6B42890106}">
   <ds:schemaRefs>
-    <ds:schemaRef ds:uri="http://schemas.microsoft.com/office/2006/metadata/contentType"/>
-    <ds:schemaRef ds:uri="http://schemas.microsoft.com/office/2006/metadata/properties/metaAttributes"/>
-    <ds:schemaRef ds:uri="http://www.w3.org/2001/XMLSchema"/>
-    <ds:schemaRef ds:uri="http://schemas.microsoft.com/office/2006/metadata/properties"/>
-    <ds:schemaRef ds:uri="http://schemas.microsoft.com/sharepoint/v3"/>
-    <ds:schemaRef ds:uri="24a4780b-b9b8-490f-9267-7801a440b1c2"/>
-    <ds:schemaRef ds:uri="6b544d46-9b2a-4003-bc91-8ec45b0e4a0d"/>
-    <ds:schemaRef ds:uri="http://schemas.microsoft.com/office/2006/documentManagement/types"/>
-    <ds:schemaRef ds:uri="http://schemas.microsoft.com/office/infopath/2007/PartnerControls"/>
-    <ds:schemaRef ds:uri="http://schemas.openxmlformats.org/package/2006/metadata/core-properties"/>
-    <ds:schemaRef ds:uri="http://purl.org/dc/elements/1.1/"/>
-    <ds:schemaRef ds:uri="http://purl.org/dc/terms/"/>
-    <ds:schemaRef ds:uri="http://schemas.microsoft.com/internal/obd"/>
+    <ds:schemaRef ds:uri="http://schemas.microsoft.com/sharepoint/v3/contenttype/forms"/>
   </ds:schemaRefs>
 </ds:datastoreItem>
 </file>
</xml_diff>

<commit_message>
Made new name for poster
</commit_message>
<xml_diff>
--- a/Poster templates_horizontal.pptx
+++ b/Poster templates_horizontal.pptx
@@ -140,6 +140,155 @@
 </p:presentation>
 </file>
 
+<file path=ppt/revisionInfo.xml><?xml version="1.0" encoding="utf-8"?>
+<p1510:revInfo xmlns:a="http://schemas.openxmlformats.org/drawingml/2006/main" xmlns:r="http://schemas.openxmlformats.org/officeDocument/2006/relationships" xmlns:p1510="http://schemas.microsoft.com/office/powerpoint/2015/10/main">
+  <p1510:revLst>
+    <p1510:client id="{B48810D3-471E-4D0F-A972-EE37187B2C82}" v="4" dt="2023-04-21T18:20:10.405"/>
+  </p1510:revLst>
+</p1510:revInfo>
+</file>
+
+<file path=ppt/changesInfos/changesInfo1.xml><?xml version="1.0" encoding="utf-8"?>
+<pc:chgInfo xmlns:a="http://schemas.openxmlformats.org/drawingml/2006/main" xmlns:r="http://schemas.openxmlformats.org/officeDocument/2006/relationships" xmlns:ac="http://schemas.microsoft.com/office/drawing/2013/main/command" xmlns:pc="http://schemas.microsoft.com/office/powerpoint/2013/main/command">
+  <pc:docChgLst>
+    <pc:chgData name="Jonathan Ray" userId="b9a55652e1e422c6" providerId="LiveId" clId="{B48810D3-471E-4D0F-A972-EE37187B2C82}"/>
+    <pc:docChg chg="undo custSel modSld">
+      <pc:chgData name="Jonathan Ray" userId="b9a55652e1e422c6" providerId="LiveId" clId="{B48810D3-471E-4D0F-A972-EE37187B2C82}" dt="2023-04-21T18:20:18.568" v="73" actId="1076"/>
+      <pc:docMkLst>
+        <pc:docMk/>
+      </pc:docMkLst>
+      <pc:sldChg chg="addSp delSp modSp mod">
+        <pc:chgData name="Jonathan Ray" userId="b9a55652e1e422c6" providerId="LiveId" clId="{B48810D3-471E-4D0F-A972-EE37187B2C82}" dt="2023-04-21T18:20:18.568" v="73" actId="1076"/>
+        <pc:sldMkLst>
+          <pc:docMk/>
+          <pc:sldMk cId="1439006157" sldId="258"/>
+        </pc:sldMkLst>
+        <pc:spChg chg="add mod">
+          <ac:chgData name="Jonathan Ray" userId="b9a55652e1e422c6" providerId="LiveId" clId="{B48810D3-471E-4D0F-A972-EE37187B2C82}" dt="2023-04-21T18:17:13.009" v="27" actId="20577"/>
+          <ac:spMkLst>
+            <pc:docMk/>
+            <pc:sldMk cId="1439006157" sldId="258"/>
+            <ac:spMk id="3" creationId="{D63DEDB6-DC4C-C333-D4A7-905BC4B34EFF}"/>
+          </ac:spMkLst>
+        </pc:spChg>
+        <pc:spChg chg="add mod">
+          <ac:chgData name="Jonathan Ray" userId="b9a55652e1e422c6" providerId="LiveId" clId="{B48810D3-471E-4D0F-A972-EE37187B2C82}" dt="2023-04-21T18:18:29.214" v="49" actId="20577"/>
+          <ac:spMkLst>
+            <pc:docMk/>
+            <pc:sldMk cId="1439006157" sldId="258"/>
+            <ac:spMk id="8" creationId="{6B539B43-F688-8CDC-1ADF-5582C68FB58E}"/>
+          </ac:spMkLst>
+        </pc:spChg>
+        <pc:spChg chg="add mod">
+          <ac:chgData name="Jonathan Ray" userId="b9a55652e1e422c6" providerId="LiveId" clId="{B48810D3-471E-4D0F-A972-EE37187B2C82}" dt="2023-04-21T18:19:32.152" v="62" actId="20577"/>
+          <ac:spMkLst>
+            <pc:docMk/>
+            <pc:sldMk cId="1439006157" sldId="258"/>
+            <ac:spMk id="9" creationId="{AD81A253-04C3-61DF-0491-A8552E8F2B81}"/>
+          </ac:spMkLst>
+        </pc:spChg>
+        <pc:spChg chg="add mod">
+          <ac:chgData name="Jonathan Ray" userId="b9a55652e1e422c6" providerId="LiveId" clId="{B48810D3-471E-4D0F-A972-EE37187B2C82}" dt="2023-04-21T18:20:18.568" v="73" actId="1076"/>
+          <ac:spMkLst>
+            <pc:docMk/>
+            <pc:sldMk cId="1439006157" sldId="258"/>
+            <ac:spMk id="10" creationId="{041A92AD-E424-C51F-8A61-F39A4ABFB6C3}"/>
+          </ac:spMkLst>
+        </pc:spChg>
+        <pc:spChg chg="mod">
+          <ac:chgData name="Jonathan Ray" userId="b9a55652e1e422c6" providerId="LiveId" clId="{B48810D3-471E-4D0F-A972-EE37187B2C82}" dt="2023-04-21T18:16:32.912" v="8" actId="1076"/>
+          <ac:spMkLst>
+            <pc:docMk/>
+            <pc:sldMk cId="1439006157" sldId="258"/>
+            <ac:spMk id="14" creationId="{00000000-0000-0000-0000-000000000000}"/>
+          </ac:spMkLst>
+        </pc:spChg>
+        <pc:spChg chg="mod">
+          <ac:chgData name="Jonathan Ray" userId="b9a55652e1e422c6" providerId="LiveId" clId="{B48810D3-471E-4D0F-A972-EE37187B2C82}" dt="2023-04-21T18:18:58.966" v="53" actId="14100"/>
+          <ac:spMkLst>
+            <pc:docMk/>
+            <pc:sldMk cId="1439006157" sldId="258"/>
+            <ac:spMk id="15" creationId="{00000000-0000-0000-0000-000000000000}"/>
+          </ac:spMkLst>
+        </pc:spChg>
+        <pc:spChg chg="mod">
+          <ac:chgData name="Jonathan Ray" userId="b9a55652e1e422c6" providerId="LiveId" clId="{B48810D3-471E-4D0F-A972-EE37187B2C82}" dt="2023-04-21T18:19:10.427" v="56" actId="1076"/>
+          <ac:spMkLst>
+            <pc:docMk/>
+            <pc:sldMk cId="1439006157" sldId="258"/>
+            <ac:spMk id="16" creationId="{00000000-0000-0000-0000-000000000000}"/>
+          </ac:spMkLst>
+        </pc:spChg>
+        <pc:spChg chg="mod">
+          <ac:chgData name="Jonathan Ray" userId="b9a55652e1e422c6" providerId="LiveId" clId="{B48810D3-471E-4D0F-A972-EE37187B2C82}" dt="2023-04-21T18:19:07.120" v="55" actId="1076"/>
+          <ac:spMkLst>
+            <pc:docMk/>
+            <pc:sldMk cId="1439006157" sldId="258"/>
+            <ac:spMk id="17" creationId="{00000000-0000-0000-0000-000000000000}"/>
+          </ac:spMkLst>
+        </pc:spChg>
+        <pc:spChg chg="mod">
+          <ac:chgData name="Jonathan Ray" userId="b9a55652e1e422c6" providerId="LiveId" clId="{B48810D3-471E-4D0F-A972-EE37187B2C82}" dt="2023-04-21T18:19:40.345" v="65" actId="1076"/>
+          <ac:spMkLst>
+            <pc:docMk/>
+            <pc:sldMk cId="1439006157" sldId="258"/>
+            <ac:spMk id="19" creationId="{00000000-0000-0000-0000-000000000000}"/>
+          </ac:spMkLst>
+        </pc:spChg>
+        <pc:spChg chg="del">
+          <ac:chgData name="Jonathan Ray" userId="b9a55652e1e422c6" providerId="LiveId" clId="{B48810D3-471E-4D0F-A972-EE37187B2C82}" dt="2023-04-21T18:17:25.232" v="28" actId="478"/>
+          <ac:spMkLst>
+            <pc:docMk/>
+            <pc:sldMk cId="1439006157" sldId="258"/>
+            <ac:spMk id="20" creationId="{00000000-0000-0000-0000-000000000000}"/>
+          </ac:spMkLst>
+        </pc:spChg>
+        <pc:spChg chg="del mod">
+          <ac:chgData name="Jonathan Ray" userId="b9a55652e1e422c6" providerId="LiveId" clId="{B48810D3-471E-4D0F-A972-EE37187B2C82}" dt="2023-04-21T18:20:07.774" v="71" actId="478"/>
+          <ac:spMkLst>
+            <pc:docMk/>
+            <pc:sldMk cId="1439006157" sldId="258"/>
+            <ac:spMk id="21" creationId="{00000000-0000-0000-0000-000000000000}"/>
+          </ac:spMkLst>
+        </pc:spChg>
+        <pc:spChg chg="mod">
+          <ac:chgData name="Jonathan Ray" userId="b9a55652e1e422c6" providerId="LiveId" clId="{B48810D3-471E-4D0F-A972-EE37187B2C82}" dt="2023-04-21T18:16:27.704" v="7" actId="1076"/>
+          <ac:spMkLst>
+            <pc:docMk/>
+            <pc:sldMk cId="1439006157" sldId="258"/>
+            <ac:spMk id="22" creationId="{00000000-0000-0000-0000-000000000000}"/>
+          </ac:spMkLst>
+        </pc:spChg>
+        <pc:spChg chg="mod">
+          <ac:chgData name="Jonathan Ray" userId="b9a55652e1e422c6" providerId="LiveId" clId="{B48810D3-471E-4D0F-A972-EE37187B2C82}" dt="2023-04-21T18:18:55.545" v="52" actId="14100"/>
+          <ac:spMkLst>
+            <pc:docMk/>
+            <pc:sldMk cId="1439006157" sldId="258"/>
+            <ac:spMk id="27" creationId="{00000000-0000-0000-0000-000000000000}"/>
+          </ac:spMkLst>
+        </pc:spChg>
+        <pc:picChg chg="del">
+          <ac:chgData name="Jonathan Ray" userId="b9a55652e1e422c6" providerId="LiveId" clId="{B48810D3-471E-4D0F-A972-EE37187B2C82}" dt="2023-04-21T18:17:27.285" v="29" actId="478"/>
+          <ac:picMkLst>
+            <pc:docMk/>
+            <pc:sldMk cId="1439006157" sldId="258"/>
+            <ac:picMk id="6" creationId="{00000000-0000-0000-0000-000000000000}"/>
+          </ac:picMkLst>
+        </pc:picChg>
+        <pc:picChg chg="mod">
+          <ac:chgData name="Jonathan Ray" userId="b9a55652e1e422c6" providerId="LiveId" clId="{B48810D3-471E-4D0F-A972-EE37187B2C82}" dt="2023-04-21T18:19:42.190" v="66" actId="1076"/>
+          <ac:picMkLst>
+            <pc:docMk/>
+            <pc:sldMk cId="1439006157" sldId="258"/>
+            <ac:picMk id="7" creationId="{B6F3872D-AFCF-76F9-B4EC-DED08D7B5FC8}"/>
+          </ac:picMkLst>
+        </pc:picChg>
+      </pc:sldChg>
+    </pc:docChg>
+  </pc:docChgLst>
+</pc:chgInfo>
+</file>
+
 <file path=ppt/notesMasters/notesMaster1.xml><?xml version="1.0" encoding="utf-8"?>
 <p:notesMaster xmlns:a="http://schemas.openxmlformats.org/drawingml/2006/main" xmlns:r="http://schemas.openxmlformats.org/officeDocument/2006/relationships" xmlns:p="http://schemas.openxmlformats.org/presentationml/2006/main">
   <p:cSld>
@@ -222,7 +371,7 @@
           <a:p>
             <a:fld id="{C8685A03-C055-4A50-BB75-8419692FA181}" type="datetimeFigureOut">
               <a:rPr lang="en-US" smtClean="0"/>
-              <a:t>4/21/23</a:t>
+              <a:t>4/21/2023</a:t>
             </a:fld>
             <a:endParaRPr lang="en-US"/>
           </a:p>
@@ -620,7 +769,7 @@
           <a:p>
             <a:fld id="{17E1FF6A-9A55-7A49-AA3D-2E4EBBB4B541}" type="datetimeFigureOut">
               <a:rPr lang="en-US" smtClean="0"/>
-              <a:t>4/21/23</a:t>
+              <a:t>4/21/2023</a:t>
             </a:fld>
             <a:endParaRPr lang="en-US"/>
           </a:p>
@@ -790,7 +939,7 @@
           <a:p>
             <a:fld id="{17E1FF6A-9A55-7A49-AA3D-2E4EBBB4B541}" type="datetimeFigureOut">
               <a:rPr lang="en-US" smtClean="0"/>
-              <a:t>4/21/23</a:t>
+              <a:t>4/21/2023</a:t>
             </a:fld>
             <a:endParaRPr lang="en-US"/>
           </a:p>
@@ -970,7 +1119,7 @@
           <a:p>
             <a:fld id="{17E1FF6A-9A55-7A49-AA3D-2E4EBBB4B541}" type="datetimeFigureOut">
               <a:rPr lang="en-US" smtClean="0"/>
-              <a:t>4/21/23</a:t>
+              <a:t>4/21/2023</a:t>
             </a:fld>
             <a:endParaRPr lang="en-US"/>
           </a:p>
@@ -1140,7 +1289,7 @@
           <a:p>
             <a:fld id="{17E1FF6A-9A55-7A49-AA3D-2E4EBBB4B541}" type="datetimeFigureOut">
               <a:rPr lang="en-US" smtClean="0"/>
-              <a:t>4/21/23</a:t>
+              <a:t>4/21/2023</a:t>
             </a:fld>
             <a:endParaRPr lang="en-US"/>
           </a:p>
@@ -1384,7 +1533,7 @@
           <a:p>
             <a:fld id="{17E1FF6A-9A55-7A49-AA3D-2E4EBBB4B541}" type="datetimeFigureOut">
               <a:rPr lang="en-US" smtClean="0"/>
-              <a:t>4/21/23</a:t>
+              <a:t>4/21/2023</a:t>
             </a:fld>
             <a:endParaRPr lang="en-US"/>
           </a:p>
@@ -1616,7 +1765,7 @@
           <a:p>
             <a:fld id="{17E1FF6A-9A55-7A49-AA3D-2E4EBBB4B541}" type="datetimeFigureOut">
               <a:rPr lang="en-US" smtClean="0"/>
-              <a:t>4/21/23</a:t>
+              <a:t>4/21/2023</a:t>
             </a:fld>
             <a:endParaRPr lang="en-US"/>
           </a:p>
@@ -1983,7 +2132,7 @@
           <a:p>
             <a:fld id="{17E1FF6A-9A55-7A49-AA3D-2E4EBBB4B541}" type="datetimeFigureOut">
               <a:rPr lang="en-US" smtClean="0"/>
-              <a:t>4/21/23</a:t>
+              <a:t>4/21/2023</a:t>
             </a:fld>
             <a:endParaRPr lang="en-US"/>
           </a:p>
@@ -2101,7 +2250,7 @@
           <a:p>
             <a:fld id="{17E1FF6A-9A55-7A49-AA3D-2E4EBBB4B541}" type="datetimeFigureOut">
               <a:rPr lang="en-US" smtClean="0"/>
-              <a:t>4/21/23</a:t>
+              <a:t>4/21/2023</a:t>
             </a:fld>
             <a:endParaRPr lang="en-US"/>
           </a:p>
@@ -2196,7 +2345,7 @@
           <a:p>
             <a:fld id="{17E1FF6A-9A55-7A49-AA3D-2E4EBBB4B541}" type="datetimeFigureOut">
               <a:rPr lang="en-US" smtClean="0"/>
-              <a:t>4/21/23</a:t>
+              <a:t>4/21/2023</a:t>
             </a:fld>
             <a:endParaRPr lang="en-US"/>
           </a:p>
@@ -2473,7 +2622,7 @@
           <a:p>
             <a:fld id="{17E1FF6A-9A55-7A49-AA3D-2E4EBBB4B541}" type="datetimeFigureOut">
               <a:rPr lang="en-US" smtClean="0"/>
-              <a:t>4/21/23</a:t>
+              <a:t>4/21/2023</a:t>
             </a:fld>
             <a:endParaRPr lang="en-US"/>
           </a:p>
@@ -2730,7 +2879,7 @@
           <a:p>
             <a:fld id="{17E1FF6A-9A55-7A49-AA3D-2E4EBBB4B541}" type="datetimeFigureOut">
               <a:rPr lang="en-US" smtClean="0"/>
-              <a:t>4/21/23</a:t>
+              <a:t>4/21/2023</a:t>
             </a:fld>
             <a:endParaRPr lang="en-US"/>
           </a:p>
@@ -2943,7 +3092,7 @@
           <a:p>
             <a:fld id="{81B1FA28-4A1F-40C5-8B9A-7CF7657742B4}" type="datetimeFigureOut">
               <a:rPr lang="en-US" smtClean="0"/>
-              <a:t>4/21/23</a:t>
+              <a:t>4/21/2023</a:t>
             </a:fld>
             <a:endParaRPr lang="en-US" dirty="0"/>
           </a:p>
@@ -3479,8 +3628,8 @@
         </p:nvSpPr>
         <p:spPr>
           <a:xfrm>
-            <a:off x="731520" y="4256447"/>
-            <a:ext cx="11386589" cy="9634718"/>
+            <a:off x="731519" y="10744230"/>
+            <a:ext cx="11386589" cy="7402153"/>
           </a:xfrm>
           <a:prstGeom prst="rect">
             <a:avLst/>
@@ -3559,8 +3708,8 @@
         </p:nvSpPr>
         <p:spPr>
           <a:xfrm>
-            <a:off x="731520" y="22358886"/>
-            <a:ext cx="11386589" cy="9898786"/>
+            <a:off x="731520" y="24422642"/>
+            <a:ext cx="11386589" cy="7764701"/>
           </a:xfrm>
           <a:prstGeom prst="rect">
             <a:avLst/>
@@ -3617,8 +3766,8 @@
         </p:nvSpPr>
         <p:spPr>
           <a:xfrm>
-            <a:off x="26619202" y="4256448"/>
-            <a:ext cx="11384280" cy="10688392"/>
+            <a:off x="26545541" y="10751428"/>
+            <a:ext cx="11384280" cy="5112786"/>
           </a:xfrm>
           <a:prstGeom prst="rect">
             <a:avLst/>
@@ -3675,8 +3824,8 @@
         </p:nvSpPr>
         <p:spPr>
           <a:xfrm>
-            <a:off x="26619202" y="15809012"/>
-            <a:ext cx="11236958" cy="8613631"/>
+            <a:off x="26619202" y="16728387"/>
+            <a:ext cx="11236958" cy="7621250"/>
           </a:xfrm>
           <a:prstGeom prst="rect">
             <a:avLst/>
@@ -3791,8 +3940,8 @@
         </p:nvSpPr>
         <p:spPr>
           <a:xfrm>
-            <a:off x="12685633" y="4256447"/>
-            <a:ext cx="13366045" cy="9543647"/>
+            <a:off x="12685632" y="10744230"/>
+            <a:ext cx="13366045" cy="10135626"/>
           </a:xfrm>
           <a:prstGeom prst="rect">
             <a:avLst/>
@@ -3837,122 +3986,6 @@
                 <a:cs typeface="Avenir Book" charset="0"/>
               </a:rPr>
               <a:t>Figure 1</a:t>
-            </a:r>
-          </a:p>
-        </p:txBody>
-      </p:sp>
-      <p:sp>
-        <p:nvSpPr>
-          <p:cNvPr id="20" name="Rectangle 19"/>
-          <p:cNvSpPr/>
-          <p:nvPr/>
-        </p:nvSpPr>
-        <p:spPr>
-          <a:xfrm>
-            <a:off x="12685633" y="24422643"/>
-            <a:ext cx="13366045" cy="7835029"/>
-          </a:xfrm>
-          <a:prstGeom prst="rect">
-            <a:avLst/>
-          </a:prstGeom>
-          <a:solidFill>
-            <a:schemeClr val="bg1"/>
-          </a:solidFill>
-          <a:ln w="6350">
-            <a:solidFill>
-              <a:schemeClr val="tx1"/>
-            </a:solidFill>
-          </a:ln>
-        </p:spPr>
-        <p:style>
-          <a:lnRef idx="2">
-            <a:schemeClr val="accent1">
-              <a:shade val="50000"/>
-            </a:schemeClr>
-          </a:lnRef>
-          <a:fillRef idx="1">
-            <a:schemeClr val="accent1"/>
-          </a:fillRef>
-          <a:effectRef idx="0">
-            <a:schemeClr val="accent1"/>
-          </a:effectRef>
-          <a:fontRef idx="minor">
-            <a:schemeClr val="lt1"/>
-          </a:fontRef>
-        </p:style>
-        <p:txBody>
-          <a:bodyPr rtlCol="0" anchor="t"/>
-          <a:lstStyle/>
-          <a:p>
-            <a:pPr defTabSz="3511068"/>
-            <a:r>
-              <a:rPr lang="en-US" sz="4400" b="1" dirty="0">
-                <a:solidFill>
-                  <a:prstClr val="black"/>
-                </a:solidFill>
-                <a:latin typeface="Avenir Book" charset="0"/>
-                <a:ea typeface="Avenir Book" charset="0"/>
-                <a:cs typeface="Avenir Book" charset="0"/>
-              </a:rPr>
-              <a:t>Table with Caption or Picture or Figure</a:t>
-            </a:r>
-          </a:p>
-        </p:txBody>
-      </p:sp>
-      <p:sp>
-        <p:nvSpPr>
-          <p:cNvPr id="21" name="Rectangle 20"/>
-          <p:cNvSpPr/>
-          <p:nvPr/>
-        </p:nvSpPr>
-        <p:spPr>
-          <a:xfrm>
-            <a:off x="12685633" y="14732828"/>
-            <a:ext cx="13366045" cy="8757081"/>
-          </a:xfrm>
-          <a:prstGeom prst="rect">
-            <a:avLst/>
-          </a:prstGeom>
-          <a:solidFill>
-            <a:schemeClr val="bg1"/>
-          </a:solidFill>
-          <a:ln w="6350">
-            <a:solidFill>
-              <a:schemeClr val="tx1"/>
-            </a:solidFill>
-          </a:ln>
-        </p:spPr>
-        <p:style>
-          <a:lnRef idx="2">
-            <a:schemeClr val="accent1">
-              <a:shade val="50000"/>
-            </a:schemeClr>
-          </a:lnRef>
-          <a:fillRef idx="1">
-            <a:schemeClr val="accent1"/>
-          </a:fillRef>
-          <a:effectRef idx="0">
-            <a:schemeClr val="accent1"/>
-          </a:effectRef>
-          <a:fontRef idx="minor">
-            <a:schemeClr val="lt1"/>
-          </a:fontRef>
-        </p:style>
-        <p:txBody>
-          <a:bodyPr rtlCol="0" anchor="t"/>
-          <a:lstStyle/>
-          <a:p>
-            <a:pPr defTabSz="3511068"/>
-            <a:r>
-              <a:rPr lang="en-US" sz="4400" b="1" dirty="0">
-                <a:solidFill>
-                  <a:prstClr val="black"/>
-                </a:solidFill>
-                <a:latin typeface="Avenir Book" charset="0"/>
-                <a:ea typeface="Avenir Book" charset="0"/>
-                <a:cs typeface="Avenir Book" charset="0"/>
-              </a:rPr>
-              <a:t>Figure 2</a:t>
             </a:r>
           </a:p>
         </p:txBody>
@@ -3996,7 +4029,7 @@
         <p:spPr>
           <a:xfrm>
             <a:off x="26619203" y="29698860"/>
-            <a:ext cx="11236958" cy="2558812"/>
+            <a:ext cx="11236958" cy="2488483"/>
           </a:xfrm>
           <a:prstGeom prst="rect">
             <a:avLst/>
@@ -4045,35 +4078,6 @@
           </a:p>
         </p:txBody>
       </p:sp>
-      <p:pic>
-        <p:nvPicPr>
-          <p:cNvPr id="6" name="Picture 5"/>
-          <p:cNvPicPr>
-            <a:picLocks noChangeAspect="1"/>
-          </p:cNvPicPr>
-          <p:nvPr/>
-        </p:nvPicPr>
-        <p:blipFill rotWithShape="1">
-          <a:blip r:embed="rId3">
-            <a:extLst>
-              <a:ext uri="{28A0092B-C50C-407E-A947-70E740481C1C}">
-                <a14:useLocalDpi xmlns:a14="http://schemas.microsoft.com/office/drawing/2010/main" val="0"/>
-              </a:ext>
-            </a:extLst>
-          </a:blip>
-          <a:srcRect t="12930" b="14215"/>
-          <a:stretch/>
-        </p:blipFill>
-        <p:spPr>
-          <a:xfrm>
-            <a:off x="15754063" y="25438566"/>
-            <a:ext cx="6896677" cy="5024581"/>
-          </a:xfrm>
-          <a:prstGeom prst="rect">
-            <a:avLst/>
-          </a:prstGeom>
-        </p:spPr>
-      </p:pic>
       <p:sp>
         <p:nvSpPr>
           <p:cNvPr id="22" name="Rectangle 21"/>
@@ -4082,8 +4086,8 @@
         </p:nvSpPr>
         <p:spPr>
           <a:xfrm>
-            <a:off x="731520" y="14708342"/>
-            <a:ext cx="11386589" cy="6833366"/>
+            <a:off x="731519" y="19111368"/>
+            <a:ext cx="11386589" cy="4318894"/>
           </a:xfrm>
           <a:prstGeom prst="rect">
             <a:avLst/>
@@ -4192,14 +4196,14 @@
           <p:nvPr/>
         </p:nvPicPr>
         <p:blipFill>
-          <a:blip r:embed="rId4"/>
+          <a:blip r:embed="rId3"/>
           <a:stretch>
             <a:fillRect/>
           </a:stretch>
         </p:blipFill>
         <p:spPr>
           <a:xfrm>
-            <a:off x="13397474" y="5413132"/>
+            <a:off x="13231219" y="12466365"/>
             <a:ext cx="11942362" cy="7370143"/>
           </a:xfrm>
           <a:prstGeom prst="rect">
@@ -4207,6 +4211,262 @@
           </a:prstGeom>
         </p:spPr>
       </p:pic>
+      <p:sp>
+        <p:nvSpPr>
+          <p:cNvPr id="3" name="Rectangle 2">
+            <a:extLst>
+              <a:ext uri="{FF2B5EF4-FFF2-40B4-BE49-F238E27FC236}">
+                <a16:creationId xmlns:a16="http://schemas.microsoft.com/office/drawing/2014/main" id="{D63DEDB6-DC4C-C333-D4A7-905BC4B34EFF}"/>
+              </a:ext>
+            </a:extLst>
+          </p:cNvPr>
+          <p:cNvSpPr/>
+          <p:nvPr/>
+        </p:nvSpPr>
+        <p:spPr>
+          <a:xfrm>
+            <a:off x="731519" y="4256446"/>
+            <a:ext cx="11386589" cy="5728245"/>
+          </a:xfrm>
+          <a:prstGeom prst="rect">
+            <a:avLst/>
+          </a:prstGeom>
+          <a:solidFill>
+            <a:schemeClr val="bg1"/>
+          </a:solidFill>
+          <a:ln w="6350">
+            <a:solidFill>
+              <a:schemeClr val="tx1"/>
+            </a:solidFill>
+          </a:ln>
+        </p:spPr>
+        <p:style>
+          <a:lnRef idx="2">
+            <a:schemeClr val="accent1">
+              <a:shade val="50000"/>
+            </a:schemeClr>
+          </a:lnRef>
+          <a:fillRef idx="1">
+            <a:schemeClr val="accent1"/>
+          </a:fillRef>
+          <a:effectRef idx="0">
+            <a:schemeClr val="accent1"/>
+          </a:effectRef>
+          <a:fontRef idx="minor">
+            <a:schemeClr val="lt1"/>
+          </a:fontRef>
+        </p:style>
+        <p:txBody>
+          <a:bodyPr rtlCol="0" anchor="t"/>
+          <a:lstStyle/>
+          <a:p>
+            <a:pPr defTabSz="3511068"/>
+            <a:r>
+              <a:rPr lang="en-US" sz="4400" b="1" dirty="0">
+                <a:solidFill>
+                  <a:prstClr val="black"/>
+                </a:solidFill>
+                <a:latin typeface="Avenir Book" charset="0"/>
+                <a:ea typeface="Avenir Book" charset="0"/>
+                <a:cs typeface="Avenir Book" charset="0"/>
+              </a:rPr>
+              <a:t>Site 1</a:t>
+            </a:r>
+          </a:p>
+        </p:txBody>
+      </p:sp>
+      <p:sp>
+        <p:nvSpPr>
+          <p:cNvPr id="8" name="Rectangle 7">
+            <a:extLst>
+              <a:ext uri="{FF2B5EF4-FFF2-40B4-BE49-F238E27FC236}">
+                <a16:creationId xmlns:a16="http://schemas.microsoft.com/office/drawing/2014/main" id="{6B539B43-F688-8CDC-1ADF-5582C68FB58E}"/>
+              </a:ext>
+            </a:extLst>
+          </p:cNvPr>
+          <p:cNvSpPr/>
+          <p:nvPr/>
+        </p:nvSpPr>
+        <p:spPr>
+          <a:xfrm>
+            <a:off x="12735609" y="4283854"/>
+            <a:ext cx="13266092" cy="5700838"/>
+          </a:xfrm>
+          <a:prstGeom prst="rect">
+            <a:avLst/>
+          </a:prstGeom>
+          <a:solidFill>
+            <a:schemeClr val="bg1"/>
+          </a:solidFill>
+          <a:ln w="6350">
+            <a:solidFill>
+              <a:schemeClr val="tx1"/>
+            </a:solidFill>
+          </a:ln>
+        </p:spPr>
+        <p:style>
+          <a:lnRef idx="2">
+            <a:schemeClr val="accent1">
+              <a:shade val="50000"/>
+            </a:schemeClr>
+          </a:lnRef>
+          <a:fillRef idx="1">
+            <a:schemeClr val="accent1"/>
+          </a:fillRef>
+          <a:effectRef idx="0">
+            <a:schemeClr val="accent1"/>
+          </a:effectRef>
+          <a:fontRef idx="minor">
+            <a:schemeClr val="lt1"/>
+          </a:fontRef>
+        </p:style>
+        <p:txBody>
+          <a:bodyPr rtlCol="0" anchor="t"/>
+          <a:lstStyle/>
+          <a:p>
+            <a:pPr defTabSz="3511068"/>
+            <a:r>
+              <a:rPr lang="en-US" sz="4400" b="1" dirty="0">
+                <a:solidFill>
+                  <a:prstClr val="black"/>
+                </a:solidFill>
+                <a:latin typeface="Avenir Book" charset="0"/>
+                <a:ea typeface="Avenir Book" charset="0"/>
+                <a:cs typeface="Avenir Book" charset="0"/>
+              </a:rPr>
+              <a:t>Site 2</a:t>
+            </a:r>
+          </a:p>
+        </p:txBody>
+      </p:sp>
+      <p:sp>
+        <p:nvSpPr>
+          <p:cNvPr id="9" name="Rectangle 8">
+            <a:extLst>
+              <a:ext uri="{FF2B5EF4-FFF2-40B4-BE49-F238E27FC236}">
+                <a16:creationId xmlns:a16="http://schemas.microsoft.com/office/drawing/2014/main" id="{AD81A253-04C3-61DF-0491-A8552E8F2B81}"/>
+              </a:ext>
+            </a:extLst>
+          </p:cNvPr>
+          <p:cNvSpPr/>
+          <p:nvPr/>
+        </p:nvSpPr>
+        <p:spPr>
+          <a:xfrm>
+            <a:off x="26619202" y="4283854"/>
+            <a:ext cx="11310619" cy="5700838"/>
+          </a:xfrm>
+          <a:prstGeom prst="rect">
+            <a:avLst/>
+          </a:prstGeom>
+          <a:solidFill>
+            <a:schemeClr val="bg1"/>
+          </a:solidFill>
+          <a:ln w="6350">
+            <a:solidFill>
+              <a:schemeClr val="tx1"/>
+            </a:solidFill>
+          </a:ln>
+        </p:spPr>
+        <p:style>
+          <a:lnRef idx="2">
+            <a:schemeClr val="accent1">
+              <a:shade val="50000"/>
+            </a:schemeClr>
+          </a:lnRef>
+          <a:fillRef idx="1">
+            <a:schemeClr val="accent1"/>
+          </a:fillRef>
+          <a:effectRef idx="0">
+            <a:schemeClr val="accent1"/>
+          </a:effectRef>
+          <a:fontRef idx="minor">
+            <a:schemeClr val="lt1"/>
+          </a:fontRef>
+        </p:style>
+        <p:txBody>
+          <a:bodyPr rtlCol="0" anchor="t"/>
+          <a:lstStyle/>
+          <a:p>
+            <a:pPr defTabSz="3511068"/>
+            <a:r>
+              <a:rPr lang="en-US" sz="4400" b="1" dirty="0">
+                <a:solidFill>
+                  <a:prstClr val="black"/>
+                </a:solidFill>
+                <a:latin typeface="Avenir Book" charset="0"/>
+                <a:ea typeface="Avenir Book" charset="0"/>
+                <a:cs typeface="Avenir Book" charset="0"/>
+              </a:rPr>
+              <a:t>Site 3</a:t>
+            </a:r>
+          </a:p>
+        </p:txBody>
+      </p:sp>
+      <p:sp>
+        <p:nvSpPr>
+          <p:cNvPr id="10" name="Rectangle 9">
+            <a:extLst>
+              <a:ext uri="{FF2B5EF4-FFF2-40B4-BE49-F238E27FC236}">
+                <a16:creationId xmlns:a16="http://schemas.microsoft.com/office/drawing/2014/main" id="{041A92AD-E424-C51F-8A61-F39A4ABFB6C3}"/>
+              </a:ext>
+            </a:extLst>
+          </p:cNvPr>
+          <p:cNvSpPr/>
+          <p:nvPr/>
+        </p:nvSpPr>
+        <p:spPr>
+          <a:xfrm>
+            <a:off x="12685632" y="21992938"/>
+            <a:ext cx="13366045" cy="10135626"/>
+          </a:xfrm>
+          <a:prstGeom prst="rect">
+            <a:avLst/>
+          </a:prstGeom>
+          <a:solidFill>
+            <a:schemeClr val="bg1"/>
+          </a:solidFill>
+          <a:ln w="6350">
+            <a:solidFill>
+              <a:schemeClr val="tx1"/>
+            </a:solidFill>
+          </a:ln>
+        </p:spPr>
+        <p:style>
+          <a:lnRef idx="2">
+            <a:schemeClr val="accent1">
+              <a:shade val="50000"/>
+            </a:schemeClr>
+          </a:lnRef>
+          <a:fillRef idx="1">
+            <a:schemeClr val="accent1"/>
+          </a:fillRef>
+          <a:effectRef idx="0">
+            <a:schemeClr val="accent1"/>
+          </a:effectRef>
+          <a:fontRef idx="minor">
+            <a:schemeClr val="lt1"/>
+          </a:fontRef>
+        </p:style>
+        <p:txBody>
+          <a:bodyPr rtlCol="0" anchor="t"/>
+          <a:lstStyle/>
+          <a:p>
+            <a:pPr defTabSz="3511068"/>
+            <a:r>
+              <a:rPr lang="en-US" sz="4400" b="1" dirty="0">
+                <a:solidFill>
+                  <a:prstClr val="black"/>
+                </a:solidFill>
+                <a:latin typeface="Avenir Book" charset="0"/>
+                <a:ea typeface="Avenir Book" charset="0"/>
+                <a:cs typeface="Avenir Book" charset="0"/>
+              </a:rPr>
+              <a:t>Figure 1</a:t>
+            </a:r>
+          </a:p>
+        </p:txBody>
+      </p:sp>
     </p:spTree>
     <p:extLst>
       <p:ext uri="{BB962C8B-B14F-4D97-AF65-F5344CB8AC3E}">
@@ -4743,15 +5003,6 @@
 </file>
 
 <file path=customXml/item1.xml><?xml version="1.0" encoding="utf-8"?>
-<?mso-contentType ?>
-<FormTemplates xmlns="http://schemas.microsoft.com/sharepoint/v3/contenttype/forms">
-  <Display>DocumentLibraryForm</Display>
-  <Edit>DocumentLibraryForm</Edit>
-  <New>DocumentLibraryForm</New>
-</FormTemplates>
-</file>
-
-<file path=customXml/item2.xml><?xml version="1.0" encoding="utf-8"?>
 <p:properties xmlns:p="http://schemas.microsoft.com/office/2006/metadata/properties" xmlns:xsi="http://www.w3.org/2001/XMLSchema-instance" xmlns:pc="http://schemas.microsoft.com/office/infopath/2007/PartnerControls">
   <documentManagement>
     <LMS_Mappings xmlns="6b544d46-9b2a-4003-bc91-8ec45b0e4a0d" xsi:nil="true"/>
@@ -4802,6 +5053,15 @@
     <FolderType xmlns="6b544d46-9b2a-4003-bc91-8ec45b0e4a0d" xsi:nil="true"/>
   </documentManagement>
 </p:properties>
+</file>
+
+<file path=customXml/item2.xml><?xml version="1.0" encoding="utf-8"?>
+<?mso-contentType ?>
+<FormTemplates xmlns="http://schemas.microsoft.com/sharepoint/v3/contenttype/forms">
+  <Display>DocumentLibraryForm</Display>
+  <Edit>DocumentLibraryForm</Edit>
+  <New>DocumentLibraryForm</New>
+</FormTemplates>
 </file>
 
 <file path=customXml/item3.xml><?xml version="1.0" encoding="utf-8"?>
@@ -5239,14 +5499,6 @@
 </file>
 
 <file path=customXml/itemProps1.xml><?xml version="1.0" encoding="utf-8"?>
-<ds:datastoreItem xmlns:ds="http://schemas.openxmlformats.org/officeDocument/2006/customXml" ds:itemID="{61FBE2F1-E3E5-4809-A97E-1E6B42890106}">
-  <ds:schemaRefs>
-    <ds:schemaRef ds:uri="http://schemas.microsoft.com/sharepoint/v3/contenttype/forms"/>
-  </ds:schemaRefs>
-</ds:datastoreItem>
-</file>
-
-<file path=customXml/itemProps2.xml><?xml version="1.0" encoding="utf-8"?>
 <ds:datastoreItem xmlns:ds="http://schemas.openxmlformats.org/officeDocument/2006/customXml" ds:itemID="{2D9B16B1-920C-4381-AE81-4B78D59980E0}">
   <ds:schemaRefs>
     <ds:schemaRef ds:uri="http://purl.org/dc/terms/"/>
@@ -5260,6 +5512,14 @@
     <ds:schemaRef ds:uri="http://schemas.openxmlformats.org/package/2006/metadata/core-properties"/>
     <ds:schemaRef ds:uri="http://schemas.microsoft.com/office/infopath/2007/PartnerControls"/>
     <ds:schemaRef ds:uri="6b544d46-9b2a-4003-bc91-8ec45b0e4a0d"/>
+  </ds:schemaRefs>
+</ds:datastoreItem>
+</file>
+
+<file path=customXml/itemProps2.xml><?xml version="1.0" encoding="utf-8"?>
+<ds:datastoreItem xmlns:ds="http://schemas.openxmlformats.org/officeDocument/2006/customXml" ds:itemID="{61FBE2F1-E3E5-4809-A97E-1E6B42890106}">
+  <ds:schemaRefs>
+    <ds:schemaRef ds:uri="http://schemas.microsoft.com/sharepoint/v3/contenttype/forms"/>
   </ds:schemaRefs>
 </ds:datastoreItem>
 </file>

</xml_diff>